<commit_message>
alteracao na DFD AC05
</commit_message>
<xml_diff>
--- a/ACS/AC7/LucasKurata_AC07.pptx
+++ b/ACS/AC7/LucasKurata_AC07.pptx
@@ -247,7 +247,7 @@
           <a:p>
             <a:fld id="{92E422EF-B27F-4667-8CA7-4B1FA23F92F5}" type="datetimeFigureOut">
               <a:rPr lang="pt-BR" smtClean="0"/>
-              <a:t>16/05/2019</a:t>
+              <a:t>17/05/2019</a:t>
             </a:fld>
             <a:endParaRPr lang="pt-BR"/>
           </a:p>
@@ -415,7 +415,7 @@
           <a:p>
             <a:fld id="{92E422EF-B27F-4667-8CA7-4B1FA23F92F5}" type="datetimeFigureOut">
               <a:rPr lang="pt-BR" smtClean="0"/>
-              <a:t>16/05/2019</a:t>
+              <a:t>17/05/2019</a:t>
             </a:fld>
             <a:endParaRPr lang="pt-BR"/>
           </a:p>
@@ -593,7 +593,7 @@
           <a:p>
             <a:fld id="{92E422EF-B27F-4667-8CA7-4B1FA23F92F5}" type="datetimeFigureOut">
               <a:rPr lang="pt-BR" smtClean="0"/>
-              <a:t>16/05/2019</a:t>
+              <a:t>17/05/2019</a:t>
             </a:fld>
             <a:endParaRPr lang="pt-BR"/>
           </a:p>
@@ -761,7 +761,7 @@
           <a:p>
             <a:fld id="{92E422EF-B27F-4667-8CA7-4B1FA23F92F5}" type="datetimeFigureOut">
               <a:rPr lang="pt-BR" smtClean="0"/>
-              <a:t>16/05/2019</a:t>
+              <a:t>17/05/2019</a:t>
             </a:fld>
             <a:endParaRPr lang="pt-BR"/>
           </a:p>
@@ -1006,7 +1006,7 @@
           <a:p>
             <a:fld id="{92E422EF-B27F-4667-8CA7-4B1FA23F92F5}" type="datetimeFigureOut">
               <a:rPr lang="pt-BR" smtClean="0"/>
-              <a:t>16/05/2019</a:t>
+              <a:t>17/05/2019</a:t>
             </a:fld>
             <a:endParaRPr lang="pt-BR"/>
           </a:p>
@@ -1235,7 +1235,7 @@
           <a:p>
             <a:fld id="{92E422EF-B27F-4667-8CA7-4B1FA23F92F5}" type="datetimeFigureOut">
               <a:rPr lang="pt-BR" smtClean="0"/>
-              <a:t>16/05/2019</a:t>
+              <a:t>17/05/2019</a:t>
             </a:fld>
             <a:endParaRPr lang="pt-BR"/>
           </a:p>
@@ -1599,7 +1599,7 @@
           <a:p>
             <a:fld id="{92E422EF-B27F-4667-8CA7-4B1FA23F92F5}" type="datetimeFigureOut">
               <a:rPr lang="pt-BR" smtClean="0"/>
-              <a:t>16/05/2019</a:t>
+              <a:t>17/05/2019</a:t>
             </a:fld>
             <a:endParaRPr lang="pt-BR"/>
           </a:p>
@@ -1716,7 +1716,7 @@
           <a:p>
             <a:fld id="{92E422EF-B27F-4667-8CA7-4B1FA23F92F5}" type="datetimeFigureOut">
               <a:rPr lang="pt-BR" smtClean="0"/>
-              <a:t>16/05/2019</a:t>
+              <a:t>17/05/2019</a:t>
             </a:fld>
             <a:endParaRPr lang="pt-BR"/>
           </a:p>
@@ -1811,7 +1811,7 @@
           <a:p>
             <a:fld id="{92E422EF-B27F-4667-8CA7-4B1FA23F92F5}" type="datetimeFigureOut">
               <a:rPr lang="pt-BR" smtClean="0"/>
-              <a:t>16/05/2019</a:t>
+              <a:t>17/05/2019</a:t>
             </a:fld>
             <a:endParaRPr lang="pt-BR"/>
           </a:p>
@@ -2086,7 +2086,7 @@
           <a:p>
             <a:fld id="{92E422EF-B27F-4667-8CA7-4B1FA23F92F5}" type="datetimeFigureOut">
               <a:rPr lang="pt-BR" smtClean="0"/>
-              <a:t>16/05/2019</a:t>
+              <a:t>17/05/2019</a:t>
             </a:fld>
             <a:endParaRPr lang="pt-BR"/>
           </a:p>
@@ -2338,7 +2338,7 @@
           <a:p>
             <a:fld id="{92E422EF-B27F-4667-8CA7-4B1FA23F92F5}" type="datetimeFigureOut">
               <a:rPr lang="pt-BR" smtClean="0"/>
-              <a:t>16/05/2019</a:t>
+              <a:t>17/05/2019</a:t>
             </a:fld>
             <a:endParaRPr lang="pt-BR"/>
           </a:p>
@@ -2549,7 +2549,7 @@
           <a:p>
             <a:fld id="{92E422EF-B27F-4667-8CA7-4B1FA23F92F5}" type="datetimeFigureOut">
               <a:rPr lang="pt-BR" smtClean="0"/>
-              <a:t>16/05/2019</a:t>
+              <a:t>17/05/2019</a:t>
             </a:fld>
             <a:endParaRPr lang="pt-BR"/>
           </a:p>
@@ -2971,13 +2971,8 @@
           <a:p>
             <a:r>
               <a:rPr lang="pt-BR" dirty="0"/>
-              <a:t>AC </a:t>
-            </a:r>
-            <a:r>
-              <a:rPr lang="pt-BR" dirty="0" smtClean="0"/>
-              <a:t>07 </a:t>
-            </a:r>
-            <a:endParaRPr lang="pt-BR" dirty="0"/>
+              <a:t>AC 07 </a:t>
+            </a:r>
           </a:p>
         </p:txBody>
       </p:sp>
@@ -3062,7 +3057,7 @@
           <p:cNvPr id="2" name="Título 1">
             <a:extLst>
               <a:ext uri="{FF2B5EF4-FFF2-40B4-BE49-F238E27FC236}">
-                <a16:creationId xmlns:a16="http://schemas.microsoft.com/office/drawing/2014/main" xmlns="" id="{41E35EBE-C448-4D39-83D1-DCD9B4281E8B}"/>
+                <a16:creationId xmlns:a16="http://schemas.microsoft.com/office/drawing/2014/main" id="{41E35EBE-C448-4D39-83D1-DCD9B4281E8B}"/>
               </a:ext>
             </a:extLst>
           </p:cNvPr>
@@ -3223,7 +3218,7 @@
               <a:buSzPct val="75000"/>
             </a:pPr>
             <a:r>
-              <a:rPr lang="pt-BR" sz="1200" dirty="0" smtClean="0"/>
+              <a:rPr lang="pt-BR" sz="1200" dirty="0"/>
               <a:t>Gerar relatório</a:t>
             </a:r>
             <a:endParaRPr lang="pt-BR" sz="1200" noProof="1">
@@ -3353,7 +3348,7 @@
           <a:p>
             <a:pPr algn="ctr"/>
             <a:r>
-              <a:rPr lang="pt-BR" sz="1200" dirty="0" smtClean="0">
+              <a:rPr lang="pt-BR" sz="1200" dirty="0">
                 <a:latin typeface="Verdana" pitchFamily="34" charset="0"/>
                 <a:ea typeface="Times New Roman" pitchFamily="18" charset="0"/>
                 <a:cs typeface="Arial" charset="0"/>
@@ -3372,7 +3367,7 @@
           <p:cNvPr id="2" name="CaixaDeTexto 1">
             <a:extLst>
               <a:ext uri="{FF2B5EF4-FFF2-40B4-BE49-F238E27FC236}">
-                <a16:creationId xmlns:a16="http://schemas.microsoft.com/office/drawing/2014/main" xmlns="" id="{A6FC0499-E96B-4A57-A7DB-FD3AD7FFD1ED}"/>
+                <a16:creationId xmlns:a16="http://schemas.microsoft.com/office/drawing/2014/main" id="{A6FC0499-E96B-4A57-A7DB-FD3AD7FFD1ED}"/>
               </a:ext>
             </a:extLst>
           </p:cNvPr>
@@ -3410,7 +3405,7 @@
           <p:cNvPr id="33" name="CaixaDeTexto 32">
             <a:extLst>
               <a:ext uri="{FF2B5EF4-FFF2-40B4-BE49-F238E27FC236}">
-                <a16:creationId xmlns:a16="http://schemas.microsoft.com/office/drawing/2014/main" xmlns="" id="{9027796C-0961-46D1-8725-3389D2548B9E}"/>
+                <a16:creationId xmlns:a16="http://schemas.microsoft.com/office/drawing/2014/main" id="{9027796C-0961-46D1-8725-3389D2548B9E}"/>
               </a:ext>
             </a:extLst>
           </p:cNvPr>
@@ -3436,10 +3431,9 @@
           <a:lstStyle/>
           <a:p>
             <a:r>
-              <a:rPr lang="pt-BR" b="1" dirty="0" smtClean="0"/>
+              <a:rPr lang="pt-BR" b="1" dirty="0"/>
               <a:t>Gerar relatório</a:t>
             </a:r>
-            <a:endParaRPr lang="pt-BR" b="1" dirty="0"/>
           </a:p>
           <a:p>
             <a:r>
@@ -3447,10 +3441,9 @@
               <a:t>Evento: </a:t>
             </a:r>
             <a:r>
-              <a:rPr lang="pt-BR" dirty="0" smtClean="0"/>
+              <a:rPr lang="pt-BR" dirty="0"/>
               <a:t>Vendedor gera relatório</a:t>
             </a:r>
-            <a:endParaRPr lang="pt-BR" dirty="0"/>
           </a:p>
           <a:p>
             <a:r>
@@ -3458,14 +3451,14 @@
               <a:t>Objetivo:  </a:t>
             </a:r>
             <a:r>
-              <a:rPr lang="pt-BR" dirty="0" smtClean="0"/>
+              <a:rPr lang="pt-BR" dirty="0"/>
               <a:t>Vendedor gera relatório das vendas e </a:t>
             </a:r>
             <a:br>
-              <a:rPr lang="pt-BR" dirty="0" smtClean="0"/>
+              <a:rPr lang="pt-BR" dirty="0"/>
             </a:br>
             <a:r>
-              <a:rPr lang="pt-BR" dirty="0" smtClean="0"/>
+              <a:rPr lang="pt-BR" dirty="0"/>
               <a:t>do estoque do dia atual;</a:t>
             </a:r>
             <a:endParaRPr lang="pt-BR" b="1" dirty="0"/>
@@ -3476,10 +3469,9 @@
               <a:t>Trabalhadores Envolvidos: </a:t>
             </a:r>
             <a:r>
-              <a:rPr lang="pt-BR" dirty="0" smtClean="0"/>
+              <a:rPr lang="pt-BR" dirty="0"/>
               <a:t>Vendedor</a:t>
             </a:r>
-            <a:endParaRPr lang="pt-BR" dirty="0"/>
           </a:p>
         </p:txBody>
       </p:sp>
@@ -3488,7 +3480,7 @@
           <p:cNvPr id="34" name="CaixaDeTexto 33">
             <a:extLst>
               <a:ext uri="{FF2B5EF4-FFF2-40B4-BE49-F238E27FC236}">
-                <a16:creationId xmlns:a16="http://schemas.microsoft.com/office/drawing/2014/main" xmlns="" id="{282A129C-45E2-42BD-ABC7-4E156E9B89CA}"/>
+                <a16:creationId xmlns:a16="http://schemas.microsoft.com/office/drawing/2014/main" id="{282A129C-45E2-42BD-ABC7-4E156E9B89CA}"/>
               </a:ext>
             </a:extLst>
           </p:cNvPr>
@@ -3517,13 +3509,8 @@
             </a:pPr>
             <a:r>
               <a:rPr lang="pt-BR" dirty="0"/>
-              <a:t>Vendedor </a:t>
-            </a:r>
-            <a:r>
-              <a:rPr lang="pt-BR" dirty="0" smtClean="0"/>
-              <a:t>após o fechamento da loja, faz o relatório do dia;</a:t>
-            </a:r>
-            <a:endParaRPr lang="pt-BR" dirty="0"/>
+              <a:t>Vendedor após o fechamento da loja, faz o relatório do dia;</a:t>
+            </a:r>
           </a:p>
           <a:p>
             <a:endParaRPr lang="pt-BR" dirty="0"/>
@@ -3535,7 +3522,7 @@
           <p:cNvPr id="35" name="Título 1">
             <a:extLst>
               <a:ext uri="{FF2B5EF4-FFF2-40B4-BE49-F238E27FC236}">
-                <a16:creationId xmlns:a16="http://schemas.microsoft.com/office/drawing/2014/main" xmlns="" id="{77CE2ED0-3A26-43BD-8017-2D08C9C12598}"/>
+                <a16:creationId xmlns:a16="http://schemas.microsoft.com/office/drawing/2014/main" id="{77CE2ED0-3A26-43BD-8017-2D08C9C12598}"/>
               </a:ext>
             </a:extLst>
           </p:cNvPr>
@@ -3631,7 +3618,7 @@
             <a:p>
               <a:pPr algn="ctr"/>
               <a:r>
-                <a:rPr lang="pt-BR" sz="1200" dirty="0" smtClean="0">
+                <a:rPr lang="pt-BR" sz="1200" dirty="0">
                   <a:latin typeface="Verdana" pitchFamily="34" charset="0"/>
                   <a:ea typeface="Times New Roman" pitchFamily="18" charset="0"/>
                   <a:cs typeface="Arial" charset="0"/>
@@ -3769,7 +3756,7 @@
             <a:p>
               <a:pPr algn="ctr"/>
               <a:r>
-                <a:rPr lang="pt-BR" sz="1200" dirty="0" smtClean="0">
+                <a:rPr lang="pt-BR" sz="1200" dirty="0">
                   <a:latin typeface="Verdana" pitchFamily="34" charset="0"/>
                   <a:ea typeface="Times New Roman" pitchFamily="18" charset="0"/>
                   <a:cs typeface="Arial" charset="0"/>
@@ -3868,7 +3855,7 @@
             <a:p>
               <a:pPr algn="ctr"/>
               <a:r>
-                <a:rPr lang="pt-BR" sz="1200" dirty="0" smtClean="0">
+                <a:rPr lang="pt-BR" sz="1200" dirty="0">
                   <a:latin typeface="Verdana" pitchFamily="34" charset="0"/>
                   <a:ea typeface="Times New Roman" pitchFamily="18" charset="0"/>
                   <a:cs typeface="Arial" charset="0"/>
@@ -4172,25 +4159,21 @@
           <a:lstStyle/>
           <a:p>
             <a:r>
-              <a:rPr lang="pt-BR" b="1" dirty="0" smtClean="0">
+              <a:rPr lang="pt-BR" b="1" dirty="0">
                 <a:latin typeface="Arial" panose="020B0604020202020204" pitchFamily="34" charset="0"/>
                 <a:cs typeface="Arial" panose="020B0604020202020204" pitchFamily="34" charset="0"/>
               </a:rPr>
               <a:t>Modelo conceitual</a:t>
             </a:r>
-            <a:endParaRPr lang="pt-BR" b="1" dirty="0">
-              <a:latin typeface="Arial" panose="020B0604020202020204" pitchFamily="34" charset="0"/>
-              <a:cs typeface="Arial" panose="020B0604020202020204" pitchFamily="34" charset="0"/>
-            </a:endParaRPr>
           </a:p>
         </p:txBody>
       </p:sp>
       <p:pic>
         <p:nvPicPr>
-          <p:cNvPr id="8" name="Imagem 7">
+          <p:cNvPr id="2" name="Imagem 1">
             <a:extLst>
               <a:ext uri="{FF2B5EF4-FFF2-40B4-BE49-F238E27FC236}">
-                <a16:creationId xmlns:a16="http://schemas.microsoft.com/office/drawing/2014/main" xmlns="" id="{6D1FB8D8-EAA5-44F2-99FE-95BE44BAB74C}"/>
+                <a16:creationId xmlns:a16="http://schemas.microsoft.com/office/drawing/2014/main" id="{D06E2904-C964-4A0C-9C5D-A22A81C21A34}"/>
               </a:ext>
             </a:extLst>
           </p:cNvPr>
@@ -4200,21 +4183,15 @@
           <p:nvPr/>
         </p:nvPicPr>
         <p:blipFill>
-          <a:blip r:embed="rId2">
-            <a:extLst>
-              <a:ext uri="{28A0092B-C50C-407E-A947-70E740481C1C}">
-                <a14:useLocalDpi xmlns:a14="http://schemas.microsoft.com/office/drawing/2010/main" val="0"/>
-              </a:ext>
-            </a:extLst>
-          </a:blip>
+          <a:blip r:embed="rId2"/>
           <a:stretch>
             <a:fillRect/>
           </a:stretch>
         </p:blipFill>
         <p:spPr>
           <a:xfrm>
-            <a:off x="1968666" y="1354931"/>
-            <a:ext cx="7422984" cy="4148138"/>
+            <a:off x="2803896" y="1663834"/>
+            <a:ext cx="6584207" cy="4011882"/>
           </a:xfrm>
           <a:prstGeom prst="rect">
             <a:avLst/>
@@ -4279,14 +4256,14 @@
                 <a:gridCol w="4064000">
                   <a:extLst>
                     <a:ext uri="{9D8B030D-6E8A-4147-A177-3AD203B41FA5}">
-                      <a16:colId xmlns:a16="http://schemas.microsoft.com/office/drawing/2014/main" xmlns="" val="20000"/>
+                      <a16:colId xmlns:a16="http://schemas.microsoft.com/office/drawing/2014/main" val="20000"/>
                     </a:ext>
                   </a:extLst>
                 </a:gridCol>
                 <a:gridCol w="4064000">
                   <a:extLst>
                     <a:ext uri="{9D8B030D-6E8A-4147-A177-3AD203B41FA5}">
-                      <a16:colId xmlns:a16="http://schemas.microsoft.com/office/drawing/2014/main" xmlns="" val="20001"/>
+                      <a16:colId xmlns:a16="http://schemas.microsoft.com/office/drawing/2014/main" val="20001"/>
                     </a:ext>
                   </a:extLst>
                 </a:gridCol>
@@ -4321,7 +4298,7 @@
                 </a:tc>
                 <a:extLst>
                   <a:ext uri="{0D108BD9-81ED-4DB2-BD59-A6C34878D82A}">
-                    <a16:rowId xmlns:a16="http://schemas.microsoft.com/office/drawing/2014/main" xmlns="" val="10000"/>
+                    <a16:rowId xmlns:a16="http://schemas.microsoft.com/office/drawing/2014/main" val="10000"/>
                   </a:ext>
                 </a:extLst>
               </a:tr>
@@ -4350,11 +4327,11 @@
                     <a:lstStyle/>
                     <a:p>
                       <a:r>
-                        <a:rPr lang="pt-BR" dirty="0" smtClean="0"/>
+                        <a:rPr lang="pt-BR" dirty="0"/>
                         <a:t>O</a:t>
                       </a:r>
                       <a:r>
-                        <a:rPr lang="pt-BR" baseline="0" dirty="0" smtClean="0"/>
+                        <a:rPr lang="pt-BR" baseline="0" dirty="0"/>
                         <a:t> Vendedor gera relatório do dia no final do expediente.</a:t>
                       </a:r>
                       <a:endParaRPr lang="pt-BR" dirty="0"/>
@@ -4364,7 +4341,7 @@
                 </a:tc>
                 <a:extLst>
                   <a:ext uri="{0D108BD9-81ED-4DB2-BD59-A6C34878D82A}">
-                    <a16:rowId xmlns:a16="http://schemas.microsoft.com/office/drawing/2014/main" xmlns="" val="10001"/>
+                    <a16:rowId xmlns:a16="http://schemas.microsoft.com/office/drawing/2014/main" val="10001"/>
                   </a:ext>
                 </a:extLst>
               </a:tr>
@@ -4462,14 +4439,14 @@
                 <a:gridCol w="4064000">
                   <a:extLst>
                     <a:ext uri="{9D8B030D-6E8A-4147-A177-3AD203B41FA5}">
-                      <a16:colId xmlns:a16="http://schemas.microsoft.com/office/drawing/2014/main" xmlns="" val="20000"/>
+                      <a16:colId xmlns:a16="http://schemas.microsoft.com/office/drawing/2014/main" val="20000"/>
                     </a:ext>
                   </a:extLst>
                 </a:gridCol>
                 <a:gridCol w="4064000">
                   <a:extLst>
                     <a:ext uri="{9D8B030D-6E8A-4147-A177-3AD203B41FA5}">
-                      <a16:colId xmlns:a16="http://schemas.microsoft.com/office/drawing/2014/main" xmlns="" val="20001"/>
+                      <a16:colId xmlns:a16="http://schemas.microsoft.com/office/drawing/2014/main" val="20001"/>
                     </a:ext>
                   </a:extLst>
                 </a:gridCol>
@@ -4503,7 +4480,7 @@
                 </a:tc>
                 <a:extLst>
                   <a:ext uri="{0D108BD9-81ED-4DB2-BD59-A6C34878D82A}">
-                    <a16:rowId xmlns:a16="http://schemas.microsoft.com/office/drawing/2014/main" xmlns="" val="10000"/>
+                    <a16:rowId xmlns:a16="http://schemas.microsoft.com/office/drawing/2014/main" val="10000"/>
                   </a:ext>
                 </a:extLst>
               </a:tr>
@@ -4536,7 +4513,7 @@
                 </a:tc>
                 <a:extLst>
                   <a:ext uri="{0D108BD9-81ED-4DB2-BD59-A6C34878D82A}">
-                    <a16:rowId xmlns:a16="http://schemas.microsoft.com/office/drawing/2014/main" xmlns="" val="10001"/>
+                    <a16:rowId xmlns:a16="http://schemas.microsoft.com/office/drawing/2014/main" val="10001"/>
                   </a:ext>
                 </a:extLst>
               </a:tr>
@@ -4569,7 +4546,7 @@
                 </a:tc>
                 <a:extLst>
                   <a:ext uri="{0D108BD9-81ED-4DB2-BD59-A6C34878D82A}">
-                    <a16:rowId xmlns:a16="http://schemas.microsoft.com/office/drawing/2014/main" xmlns="" val="10002"/>
+                    <a16:rowId xmlns:a16="http://schemas.microsoft.com/office/drawing/2014/main" val="10002"/>
                   </a:ext>
                 </a:extLst>
               </a:tr>

</xml_diff>